<commit_message>
Update TSP for shortest wordchain.pptx
</commit_message>
<xml_diff>
--- a/TSP for shortest wordchain.pptx
+++ b/TSP for shortest wordchain.pptx
@@ -6,8 +6,7 @@
   </p:sldMasterIdLst>
   <p:sldIdLst>
     <p:sldId id="256" r:id="rId2"/>
-    <p:sldId id="261" r:id="rId3"/>
-    <p:sldId id="260" r:id="rId4"/>
+    <p:sldId id="260" r:id="rId3"/>
   </p:sldIdLst>
   <p:sldSz cx="12192000" cy="6858000"/>
   <p:notesSz cx="6858000" cy="9144000"/>
@@ -4266,959 +4265,6 @@
           <a:chExt cx="0" cy="0"/>
         </a:xfrm>
       </p:grpSpPr>
-      <p:grpSp>
-        <p:nvGrpSpPr>
-          <p:cNvPr id="134" name="Group 133">
-            <a:extLst>
-              <a:ext uri="{FF2B5EF4-FFF2-40B4-BE49-F238E27FC236}">
-                <a16:creationId xmlns:a16="http://schemas.microsoft.com/office/drawing/2014/main" id="{15BC4F70-7C5D-480E-9D24-A53232BEE50D}"/>
-              </a:ext>
-            </a:extLst>
-          </p:cNvPr>
-          <p:cNvGrpSpPr/>
-          <p:nvPr/>
-        </p:nvGrpSpPr>
-        <p:grpSpPr>
-          <a:xfrm>
-            <a:off x="1547675" y="1307075"/>
-            <a:ext cx="7075543" cy="5137365"/>
-            <a:chOff x="1547675" y="1307075"/>
-            <a:chExt cx="7075543" cy="5137365"/>
-          </a:xfrm>
-        </p:grpSpPr>
-        <p:cxnSp>
-          <p:nvCxnSpPr>
-            <p:cNvPr id="12" name="Straight Arrow Connector 11">
-              <a:extLst>
-                <a:ext uri="{FF2B5EF4-FFF2-40B4-BE49-F238E27FC236}">
-                  <a16:creationId xmlns:a16="http://schemas.microsoft.com/office/drawing/2014/main" id="{6536384B-2207-40B4-ACF4-BB4EC5959E09}"/>
-                </a:ext>
-              </a:extLst>
-            </p:cNvPr>
-            <p:cNvCxnSpPr>
-              <a:cxnSpLocks/>
-              <a:stCxn id="16" idx="6"/>
-              <a:endCxn id="21" idx="7"/>
-            </p:cNvCxnSpPr>
-            <p:nvPr/>
-          </p:nvCxnSpPr>
-          <p:spPr>
-            <a:xfrm>
-              <a:off x="4017680" y="1530732"/>
-              <a:ext cx="2914328" cy="4531902"/>
-            </a:xfrm>
-            <a:prstGeom prst="straightConnector1">
-              <a:avLst/>
-            </a:prstGeom>
-            <a:ln w="19050">
-              <a:tailEnd type="triangle" w="lg" len="lg"/>
-            </a:ln>
-          </p:spPr>
-          <p:style>
-            <a:lnRef idx="1">
-              <a:schemeClr val="dk1"/>
-            </a:lnRef>
-            <a:fillRef idx="0">
-              <a:schemeClr val="dk1"/>
-            </a:fillRef>
-            <a:effectRef idx="0">
-              <a:schemeClr val="dk1"/>
-            </a:effectRef>
-            <a:fontRef idx="minor">
-              <a:schemeClr val="tx1"/>
-            </a:fontRef>
-          </p:style>
-        </p:cxnSp>
-        <p:sp>
-          <p:nvSpPr>
-            <p:cNvPr id="16" name="Oval 15">
-              <a:extLst>
-                <a:ext uri="{FF2B5EF4-FFF2-40B4-BE49-F238E27FC236}">
-                  <a16:creationId xmlns:a16="http://schemas.microsoft.com/office/drawing/2014/main" id="{4C948CA7-E17B-4279-B70E-026371B83623}"/>
-                </a:ext>
-              </a:extLst>
-            </p:cNvPr>
-            <p:cNvSpPr/>
-            <p:nvPr/>
-          </p:nvSpPr>
-          <p:spPr>
-            <a:xfrm>
-              <a:off x="3105265" y="1307075"/>
-              <a:ext cx="912415" cy="447314"/>
-            </a:xfrm>
-            <a:prstGeom prst="ellipse">
-              <a:avLst/>
-            </a:prstGeom>
-            <a:solidFill>
-              <a:schemeClr val="bg1"/>
-            </a:solidFill>
-            <a:ln w="19050">
-              <a:solidFill>
-                <a:schemeClr val="tx1"/>
-              </a:solidFill>
-            </a:ln>
-          </p:spPr>
-          <p:style>
-            <a:lnRef idx="2">
-              <a:schemeClr val="accent1">
-                <a:shade val="50000"/>
-              </a:schemeClr>
-            </a:lnRef>
-            <a:fillRef idx="1">
-              <a:schemeClr val="accent1"/>
-            </a:fillRef>
-            <a:effectRef idx="0">
-              <a:schemeClr val="accent1"/>
-            </a:effectRef>
-            <a:fontRef idx="minor">
-              <a:schemeClr val="lt1"/>
-            </a:fontRef>
-          </p:style>
-          <p:txBody>
-            <a:bodyPr rtlCol="0" anchor="ctr"/>
-            <a:lstStyle/>
-            <a:p>
-              <a:pPr algn="ctr"/>
-              <a:r>
-                <a:rPr lang="en-US" dirty="0">
-                  <a:solidFill>
-                    <a:schemeClr val="tx1"/>
-                  </a:solidFill>
-                </a:rPr>
-                <a:t>rear</a:t>
-              </a:r>
-            </a:p>
-          </p:txBody>
-        </p:sp>
-        <p:sp>
-          <p:nvSpPr>
-            <p:cNvPr id="19" name="Oval 18">
-              <a:extLst>
-                <a:ext uri="{FF2B5EF4-FFF2-40B4-BE49-F238E27FC236}">
-                  <a16:creationId xmlns:a16="http://schemas.microsoft.com/office/drawing/2014/main" id="{FA1953D9-AD37-4EF3-ABC8-2C26988C71FB}"/>
-                </a:ext>
-              </a:extLst>
-            </p:cNvPr>
-            <p:cNvSpPr/>
-            <p:nvPr/>
-          </p:nvSpPr>
-          <p:spPr>
-            <a:xfrm>
-              <a:off x="6153213" y="1307075"/>
-              <a:ext cx="912415" cy="447314"/>
-            </a:xfrm>
-            <a:prstGeom prst="ellipse">
-              <a:avLst/>
-            </a:prstGeom>
-            <a:solidFill>
-              <a:schemeClr val="bg1"/>
-            </a:solidFill>
-            <a:ln w="19050">
-              <a:solidFill>
-                <a:schemeClr val="tx1"/>
-              </a:solidFill>
-            </a:ln>
-          </p:spPr>
-          <p:style>
-            <a:lnRef idx="2">
-              <a:schemeClr val="accent1">
-                <a:shade val="50000"/>
-              </a:schemeClr>
-            </a:lnRef>
-            <a:fillRef idx="1">
-              <a:schemeClr val="accent1"/>
-            </a:fillRef>
-            <a:effectRef idx="0">
-              <a:schemeClr val="accent1"/>
-            </a:effectRef>
-            <a:fontRef idx="minor">
-              <a:schemeClr val="lt1"/>
-            </a:fontRef>
-          </p:style>
-          <p:txBody>
-            <a:bodyPr rtlCol="0" anchor="ctr"/>
-            <a:lstStyle/>
-            <a:p>
-              <a:pPr algn="ctr"/>
-              <a:r>
-                <a:rPr lang="en-US" dirty="0" err="1">
-                  <a:solidFill>
-                    <a:schemeClr val="tx1"/>
-                  </a:solidFill>
-                </a:rPr>
-                <a:t>odec</a:t>
-              </a:r>
-              <a:endParaRPr lang="en-US" dirty="0">
-                <a:solidFill>
-                  <a:schemeClr val="tx1"/>
-                </a:solidFill>
-              </a:endParaRPr>
-            </a:p>
-          </p:txBody>
-        </p:sp>
-        <p:sp>
-          <p:nvSpPr>
-            <p:cNvPr id="20" name="Oval 19">
-              <a:extLst>
-                <a:ext uri="{FF2B5EF4-FFF2-40B4-BE49-F238E27FC236}">
-                  <a16:creationId xmlns:a16="http://schemas.microsoft.com/office/drawing/2014/main" id="{75C71D19-54E3-40F3-A281-1CD0F4EF66A4}"/>
-                </a:ext>
-              </a:extLst>
-            </p:cNvPr>
-            <p:cNvSpPr/>
-            <p:nvPr/>
-          </p:nvSpPr>
-          <p:spPr>
-            <a:xfrm>
-              <a:off x="7710803" y="3667487"/>
-              <a:ext cx="912415" cy="447314"/>
-            </a:xfrm>
-            <a:prstGeom prst="ellipse">
-              <a:avLst/>
-            </a:prstGeom>
-            <a:solidFill>
-              <a:schemeClr val="bg1"/>
-            </a:solidFill>
-            <a:ln w="19050">
-              <a:solidFill>
-                <a:schemeClr val="tx1"/>
-              </a:solidFill>
-            </a:ln>
-          </p:spPr>
-          <p:style>
-            <a:lnRef idx="2">
-              <a:schemeClr val="accent1">
-                <a:shade val="50000"/>
-              </a:schemeClr>
-            </a:lnRef>
-            <a:fillRef idx="1">
-              <a:schemeClr val="accent1"/>
-            </a:fillRef>
-            <a:effectRef idx="0">
-              <a:schemeClr val="accent1"/>
-            </a:effectRef>
-            <a:fontRef idx="minor">
-              <a:schemeClr val="lt1"/>
-            </a:fontRef>
-          </p:style>
-          <p:txBody>
-            <a:bodyPr rtlCol="0" anchor="ctr"/>
-            <a:lstStyle/>
-            <a:p>
-              <a:pPr algn="ctr"/>
-              <a:r>
-                <a:rPr lang="en-US" dirty="0">
-                  <a:solidFill>
-                    <a:schemeClr val="tx1"/>
-                  </a:solidFill>
-                </a:rPr>
-                <a:t>deco</a:t>
-              </a:r>
-            </a:p>
-          </p:txBody>
-        </p:sp>
-        <p:sp>
-          <p:nvSpPr>
-            <p:cNvPr id="21" name="Oval 20">
-              <a:extLst>
-                <a:ext uri="{FF2B5EF4-FFF2-40B4-BE49-F238E27FC236}">
-                  <a16:creationId xmlns:a16="http://schemas.microsoft.com/office/drawing/2014/main" id="{82BC07D9-EBF0-42FE-AB3D-EAA125164D3B}"/>
-                </a:ext>
-              </a:extLst>
-            </p:cNvPr>
-            <p:cNvSpPr/>
-            <p:nvPr/>
-          </p:nvSpPr>
-          <p:spPr>
-            <a:xfrm>
-              <a:off x="6153213" y="5997126"/>
-              <a:ext cx="912415" cy="447314"/>
-            </a:xfrm>
-            <a:prstGeom prst="ellipse">
-              <a:avLst/>
-            </a:prstGeom>
-            <a:solidFill>
-              <a:schemeClr val="bg1"/>
-            </a:solidFill>
-            <a:ln w="19050">
-              <a:solidFill>
-                <a:schemeClr val="tx1"/>
-              </a:solidFill>
-            </a:ln>
-          </p:spPr>
-          <p:style>
-            <a:lnRef idx="2">
-              <a:schemeClr val="accent1">
-                <a:shade val="50000"/>
-              </a:schemeClr>
-            </a:lnRef>
-            <a:fillRef idx="1">
-              <a:schemeClr val="accent1"/>
-            </a:fillRef>
-            <a:effectRef idx="0">
-              <a:schemeClr val="accent1"/>
-            </a:effectRef>
-            <a:fontRef idx="minor">
-              <a:schemeClr val="lt1"/>
-            </a:fontRef>
-          </p:style>
-          <p:txBody>
-            <a:bodyPr rtlCol="0" anchor="ctr"/>
-            <a:lstStyle/>
-            <a:p>
-              <a:pPr algn="ctr"/>
-              <a:r>
-                <a:rPr lang="en-US" dirty="0">
-                  <a:solidFill>
-                    <a:schemeClr val="tx1"/>
-                  </a:solidFill>
-                </a:rPr>
-                <a:t>area</a:t>
-              </a:r>
-            </a:p>
-          </p:txBody>
-        </p:sp>
-        <p:sp>
-          <p:nvSpPr>
-            <p:cNvPr id="23" name="Oval 22">
-              <a:extLst>
-                <a:ext uri="{FF2B5EF4-FFF2-40B4-BE49-F238E27FC236}">
-                  <a16:creationId xmlns:a16="http://schemas.microsoft.com/office/drawing/2014/main" id="{788DC985-2A87-4F87-B8F3-028A36D24BE9}"/>
-                </a:ext>
-              </a:extLst>
-            </p:cNvPr>
-            <p:cNvSpPr/>
-            <p:nvPr/>
-          </p:nvSpPr>
-          <p:spPr>
-            <a:xfrm>
-              <a:off x="3105265" y="5997126"/>
-              <a:ext cx="912415" cy="447314"/>
-            </a:xfrm>
-            <a:prstGeom prst="ellipse">
-              <a:avLst/>
-            </a:prstGeom>
-            <a:solidFill>
-              <a:schemeClr val="bg1"/>
-            </a:solidFill>
-            <a:ln w="19050">
-              <a:solidFill>
-                <a:schemeClr val="tx1"/>
-              </a:solidFill>
-            </a:ln>
-          </p:spPr>
-          <p:style>
-            <a:lnRef idx="2">
-              <a:schemeClr val="accent1">
-                <a:shade val="50000"/>
-              </a:schemeClr>
-            </a:lnRef>
-            <a:fillRef idx="1">
-              <a:schemeClr val="accent1"/>
-            </a:fillRef>
-            <a:effectRef idx="0">
-              <a:schemeClr val="accent1"/>
-            </a:effectRef>
-            <a:fontRef idx="minor">
-              <a:schemeClr val="lt1"/>
-            </a:fontRef>
-          </p:style>
-          <p:txBody>
-            <a:bodyPr rtlCol="0" anchor="ctr"/>
-            <a:lstStyle/>
-            <a:p>
-              <a:pPr algn="ctr"/>
-              <a:r>
-                <a:rPr lang="en-US" dirty="0">
-                  <a:solidFill>
-                    <a:schemeClr val="tx1"/>
-                  </a:solidFill>
-                </a:rPr>
-                <a:t>code</a:t>
-              </a:r>
-            </a:p>
-          </p:txBody>
-        </p:sp>
-        <p:sp>
-          <p:nvSpPr>
-            <p:cNvPr id="24" name="Oval 23">
-              <a:extLst>
-                <a:ext uri="{FF2B5EF4-FFF2-40B4-BE49-F238E27FC236}">
-                  <a16:creationId xmlns:a16="http://schemas.microsoft.com/office/drawing/2014/main" id="{A63E13FB-2226-47C0-B03C-73137FC8F088}"/>
-                </a:ext>
-              </a:extLst>
-            </p:cNvPr>
-            <p:cNvSpPr/>
-            <p:nvPr/>
-          </p:nvSpPr>
-          <p:spPr>
-            <a:xfrm>
-              <a:off x="1547675" y="3667487"/>
-              <a:ext cx="912415" cy="447314"/>
-            </a:xfrm>
-            <a:prstGeom prst="ellipse">
-              <a:avLst/>
-            </a:prstGeom>
-            <a:solidFill>
-              <a:schemeClr val="bg1"/>
-            </a:solidFill>
-            <a:ln w="19050">
-              <a:solidFill>
-                <a:schemeClr val="tx1"/>
-              </a:solidFill>
-            </a:ln>
-          </p:spPr>
-          <p:style>
-            <a:lnRef idx="2">
-              <a:schemeClr val="accent1">
-                <a:shade val="50000"/>
-              </a:schemeClr>
-            </a:lnRef>
-            <a:fillRef idx="1">
-              <a:schemeClr val="accent1"/>
-            </a:fillRef>
-            <a:effectRef idx="0">
-              <a:schemeClr val="accent1"/>
-            </a:effectRef>
-            <a:fontRef idx="minor">
-              <a:schemeClr val="lt1"/>
-            </a:fontRef>
-          </p:style>
-          <p:txBody>
-            <a:bodyPr rtlCol="0" anchor="ctr"/>
-            <a:lstStyle/>
-            <a:p>
-              <a:pPr algn="ctr"/>
-              <a:r>
-                <a:rPr lang="en-US" dirty="0">
-                  <a:solidFill>
-                    <a:schemeClr val="tx1"/>
-                  </a:solidFill>
-                </a:rPr>
-                <a:t>dear</a:t>
-              </a:r>
-            </a:p>
-          </p:txBody>
-        </p:sp>
-        <p:cxnSp>
-          <p:nvCxnSpPr>
-            <p:cNvPr id="27" name="Straight Arrow Connector 26">
-              <a:extLst>
-                <a:ext uri="{FF2B5EF4-FFF2-40B4-BE49-F238E27FC236}">
-                  <a16:creationId xmlns:a16="http://schemas.microsoft.com/office/drawing/2014/main" id="{EEF4C5E5-CEC0-4AC0-A836-01B93DF7E552}"/>
-                </a:ext>
-              </a:extLst>
-            </p:cNvPr>
-            <p:cNvCxnSpPr>
-              <a:cxnSpLocks/>
-              <a:stCxn id="16" idx="2"/>
-              <a:endCxn id="24" idx="1"/>
-            </p:cNvCxnSpPr>
-            <p:nvPr/>
-          </p:nvCxnSpPr>
-          <p:spPr>
-            <a:xfrm flipH="1">
-              <a:off x="1681295" y="1530732"/>
-              <a:ext cx="1423970" cy="2202263"/>
-            </a:xfrm>
-            <a:prstGeom prst="straightConnector1">
-              <a:avLst/>
-            </a:prstGeom>
-            <a:ln w="19050">
-              <a:tailEnd type="triangle" w="lg" len="lg"/>
-            </a:ln>
-          </p:spPr>
-          <p:style>
-            <a:lnRef idx="1">
-              <a:schemeClr val="dk1"/>
-            </a:lnRef>
-            <a:fillRef idx="0">
-              <a:schemeClr val="dk1"/>
-            </a:fillRef>
-            <a:effectRef idx="0">
-              <a:schemeClr val="dk1"/>
-            </a:effectRef>
-            <a:fontRef idx="minor">
-              <a:schemeClr val="tx1"/>
-            </a:fontRef>
-          </p:style>
-        </p:cxnSp>
-        <p:cxnSp>
-          <p:nvCxnSpPr>
-            <p:cNvPr id="33" name="Straight Arrow Connector 32">
-              <a:extLst>
-                <a:ext uri="{FF2B5EF4-FFF2-40B4-BE49-F238E27FC236}">
-                  <a16:creationId xmlns:a16="http://schemas.microsoft.com/office/drawing/2014/main" id="{A9019265-DFF0-4A77-90B2-6EB06EE201F8}"/>
-                </a:ext>
-              </a:extLst>
-            </p:cNvPr>
-            <p:cNvCxnSpPr>
-              <a:cxnSpLocks/>
-              <a:stCxn id="19" idx="5"/>
-              <a:endCxn id="20" idx="0"/>
-            </p:cNvCxnSpPr>
-            <p:nvPr/>
-          </p:nvCxnSpPr>
-          <p:spPr>
-            <a:xfrm>
-              <a:off x="6932008" y="1688881"/>
-              <a:ext cx="1235003" cy="1978606"/>
-            </a:xfrm>
-            <a:prstGeom prst="straightConnector1">
-              <a:avLst/>
-            </a:prstGeom>
-            <a:ln w="19050">
-              <a:solidFill>
-                <a:schemeClr val="accent2"/>
-              </a:solidFill>
-              <a:tailEnd type="triangle" w="lg" len="lg"/>
-            </a:ln>
-          </p:spPr>
-          <p:style>
-            <a:lnRef idx="1">
-              <a:schemeClr val="dk1"/>
-            </a:lnRef>
-            <a:fillRef idx="0">
-              <a:schemeClr val="dk1"/>
-            </a:fillRef>
-            <a:effectRef idx="0">
-              <a:schemeClr val="dk1"/>
-            </a:effectRef>
-            <a:fontRef idx="minor">
-              <a:schemeClr val="tx1"/>
-            </a:fontRef>
-          </p:style>
-        </p:cxnSp>
-        <p:cxnSp>
-          <p:nvCxnSpPr>
-            <p:cNvPr id="37" name="Straight Arrow Connector 36">
-              <a:extLst>
-                <a:ext uri="{FF2B5EF4-FFF2-40B4-BE49-F238E27FC236}">
-                  <a16:creationId xmlns:a16="http://schemas.microsoft.com/office/drawing/2014/main" id="{6DC6CB87-7765-4D48-A0DB-1712CF5B4BB9}"/>
-                </a:ext>
-              </a:extLst>
-            </p:cNvPr>
-            <p:cNvCxnSpPr>
-              <a:cxnSpLocks/>
-              <a:stCxn id="19" idx="2"/>
-              <a:endCxn id="23" idx="1"/>
-            </p:cNvCxnSpPr>
-            <p:nvPr/>
-          </p:nvCxnSpPr>
-          <p:spPr>
-            <a:xfrm flipH="1">
-              <a:off x="3238885" y="1530732"/>
-              <a:ext cx="2914328" cy="4531902"/>
-            </a:xfrm>
-            <a:prstGeom prst="straightConnector1">
-              <a:avLst/>
-            </a:prstGeom>
-            <a:ln w="19050">
-              <a:tailEnd type="triangle" w="lg" len="lg"/>
-            </a:ln>
-          </p:spPr>
-          <p:style>
-            <a:lnRef idx="1">
-              <a:schemeClr val="dk1"/>
-            </a:lnRef>
-            <a:fillRef idx="0">
-              <a:schemeClr val="dk1"/>
-            </a:fillRef>
-            <a:effectRef idx="0">
-              <a:schemeClr val="dk1"/>
-            </a:effectRef>
-            <a:fontRef idx="minor">
-              <a:schemeClr val="tx1"/>
-            </a:fontRef>
-          </p:style>
-        </p:cxnSp>
-        <p:cxnSp>
-          <p:nvCxnSpPr>
-            <p:cNvPr id="40" name="Straight Arrow Connector 39">
-              <a:extLst>
-                <a:ext uri="{FF2B5EF4-FFF2-40B4-BE49-F238E27FC236}">
-                  <a16:creationId xmlns:a16="http://schemas.microsoft.com/office/drawing/2014/main" id="{5730CCFC-D538-4D34-BEA8-B798E0B98AFF}"/>
-                </a:ext>
-              </a:extLst>
-            </p:cNvPr>
-            <p:cNvCxnSpPr>
-              <a:cxnSpLocks/>
-              <a:stCxn id="20" idx="1"/>
-              <a:endCxn id="19" idx="4"/>
-            </p:cNvCxnSpPr>
-            <p:nvPr/>
-          </p:nvCxnSpPr>
-          <p:spPr>
-            <a:xfrm flipH="1" flipV="1">
-              <a:off x="6609421" y="1754389"/>
-              <a:ext cx="1235002" cy="1978606"/>
-            </a:xfrm>
-            <a:prstGeom prst="straightConnector1">
-              <a:avLst/>
-            </a:prstGeom>
-            <a:ln w="19050">
-              <a:tailEnd type="triangle" w="lg" len="lg"/>
-            </a:ln>
-          </p:spPr>
-          <p:style>
-            <a:lnRef idx="1">
-              <a:schemeClr val="dk1"/>
-            </a:lnRef>
-            <a:fillRef idx="0">
-              <a:schemeClr val="dk1"/>
-            </a:fillRef>
-            <a:effectRef idx="0">
-              <a:schemeClr val="dk1"/>
-            </a:effectRef>
-            <a:fontRef idx="minor">
-              <a:schemeClr val="tx1"/>
-            </a:fontRef>
-          </p:style>
-        </p:cxnSp>
-        <p:cxnSp>
-          <p:nvCxnSpPr>
-            <p:cNvPr id="44" name="Straight Arrow Connector 43">
-              <a:extLst>
-                <a:ext uri="{FF2B5EF4-FFF2-40B4-BE49-F238E27FC236}">
-                  <a16:creationId xmlns:a16="http://schemas.microsoft.com/office/drawing/2014/main" id="{631E2BA5-368B-403E-8106-695A5DDAEC20}"/>
-                </a:ext>
-              </a:extLst>
-            </p:cNvPr>
-            <p:cNvCxnSpPr>
-              <a:cxnSpLocks/>
-              <a:stCxn id="20" idx="3"/>
-              <a:endCxn id="23" idx="6"/>
-            </p:cNvCxnSpPr>
-            <p:nvPr/>
-          </p:nvCxnSpPr>
-          <p:spPr>
-            <a:xfrm flipH="1">
-              <a:off x="4017680" y="4049293"/>
-              <a:ext cx="3826743" cy="2171490"/>
-            </a:xfrm>
-            <a:prstGeom prst="straightConnector1">
-              <a:avLst/>
-            </a:prstGeom>
-            <a:ln w="19050">
-              <a:solidFill>
-                <a:schemeClr val="accent2"/>
-              </a:solidFill>
-              <a:tailEnd type="triangle" w="lg" len="lg"/>
-            </a:ln>
-          </p:spPr>
-          <p:style>
-            <a:lnRef idx="1">
-              <a:schemeClr val="dk1"/>
-            </a:lnRef>
-            <a:fillRef idx="0">
-              <a:schemeClr val="dk1"/>
-            </a:fillRef>
-            <a:effectRef idx="0">
-              <a:schemeClr val="dk1"/>
-            </a:effectRef>
-            <a:fontRef idx="minor">
-              <a:schemeClr val="tx1"/>
-            </a:fontRef>
-          </p:style>
-        </p:cxnSp>
-        <p:cxnSp>
-          <p:nvCxnSpPr>
-            <p:cNvPr id="50" name="Straight Arrow Connector 49">
-              <a:extLst>
-                <a:ext uri="{FF2B5EF4-FFF2-40B4-BE49-F238E27FC236}">
-                  <a16:creationId xmlns:a16="http://schemas.microsoft.com/office/drawing/2014/main" id="{FC8D00A2-F97E-4394-8554-A51E0ED3C631}"/>
-                </a:ext>
-              </a:extLst>
-            </p:cNvPr>
-            <p:cNvCxnSpPr>
-              <a:cxnSpLocks/>
-              <a:stCxn id="21" idx="0"/>
-              <a:endCxn id="16" idx="5"/>
-            </p:cNvCxnSpPr>
-            <p:nvPr/>
-          </p:nvCxnSpPr>
-          <p:spPr>
-            <a:xfrm flipH="1" flipV="1">
-              <a:off x="3884060" y="1688881"/>
-              <a:ext cx="2725361" cy="4308245"/>
-            </a:xfrm>
-            <a:prstGeom prst="straightConnector1">
-              <a:avLst/>
-            </a:prstGeom>
-            <a:ln w="19050">
-              <a:solidFill>
-                <a:schemeClr val="accent2"/>
-              </a:solidFill>
-              <a:tailEnd type="triangle" w="lg" len="lg"/>
-            </a:ln>
-          </p:spPr>
-          <p:style>
-            <a:lnRef idx="1">
-              <a:schemeClr val="dk1"/>
-            </a:lnRef>
-            <a:fillRef idx="0">
-              <a:schemeClr val="dk1"/>
-            </a:fillRef>
-            <a:effectRef idx="0">
-              <a:schemeClr val="dk1"/>
-            </a:effectRef>
-            <a:fontRef idx="minor">
-              <a:schemeClr val="tx1"/>
-            </a:fontRef>
-          </p:style>
-        </p:cxnSp>
-        <p:cxnSp>
-          <p:nvCxnSpPr>
-            <p:cNvPr id="54" name="Straight Arrow Connector 53">
-              <a:extLst>
-                <a:ext uri="{FF2B5EF4-FFF2-40B4-BE49-F238E27FC236}">
-                  <a16:creationId xmlns:a16="http://schemas.microsoft.com/office/drawing/2014/main" id="{CC11C02C-45E3-4149-8296-A442B7CF6C2E}"/>
-                </a:ext>
-              </a:extLst>
-            </p:cNvPr>
-            <p:cNvCxnSpPr>
-              <a:cxnSpLocks/>
-              <a:stCxn id="23" idx="7"/>
-              <a:endCxn id="20" idx="2"/>
-            </p:cNvCxnSpPr>
-            <p:nvPr/>
-          </p:nvCxnSpPr>
-          <p:spPr>
-            <a:xfrm flipV="1">
-              <a:off x="3884060" y="3891144"/>
-              <a:ext cx="3826743" cy="2171490"/>
-            </a:xfrm>
-            <a:prstGeom prst="straightConnector1">
-              <a:avLst/>
-            </a:prstGeom>
-            <a:ln w="19050">
-              <a:tailEnd type="triangle" w="lg" len="lg"/>
-            </a:ln>
-          </p:spPr>
-          <p:style>
-            <a:lnRef idx="1">
-              <a:schemeClr val="dk1"/>
-            </a:lnRef>
-            <a:fillRef idx="0">
-              <a:schemeClr val="dk1"/>
-            </a:fillRef>
-            <a:effectRef idx="0">
-              <a:schemeClr val="dk1"/>
-            </a:effectRef>
-            <a:fontRef idx="minor">
-              <a:schemeClr val="tx1"/>
-            </a:fontRef>
-          </p:style>
-        </p:cxnSp>
-        <p:cxnSp>
-          <p:nvCxnSpPr>
-            <p:cNvPr id="58" name="Straight Arrow Connector 57">
-              <a:extLst>
-                <a:ext uri="{FF2B5EF4-FFF2-40B4-BE49-F238E27FC236}">
-                  <a16:creationId xmlns:a16="http://schemas.microsoft.com/office/drawing/2014/main" id="{83AA93D8-A82D-4E79-9B7E-A0CAE88FBC02}"/>
-                </a:ext>
-              </a:extLst>
-            </p:cNvPr>
-            <p:cNvCxnSpPr>
-              <a:cxnSpLocks/>
-              <a:stCxn id="23" idx="0"/>
-              <a:endCxn id="19" idx="3"/>
-            </p:cNvCxnSpPr>
-            <p:nvPr/>
-          </p:nvCxnSpPr>
-          <p:spPr>
-            <a:xfrm flipV="1">
-              <a:off x="3561473" y="1688881"/>
-              <a:ext cx="2725360" cy="4308245"/>
-            </a:xfrm>
-            <a:prstGeom prst="straightConnector1">
-              <a:avLst/>
-            </a:prstGeom>
-            <a:ln w="19050">
-              <a:tailEnd type="triangle" w="lg" len="lg"/>
-            </a:ln>
-          </p:spPr>
-          <p:style>
-            <a:lnRef idx="1">
-              <a:schemeClr val="dk1"/>
-            </a:lnRef>
-            <a:fillRef idx="0">
-              <a:schemeClr val="dk1"/>
-            </a:fillRef>
-            <a:effectRef idx="0">
-              <a:schemeClr val="dk1"/>
-            </a:effectRef>
-            <a:fontRef idx="minor">
-              <a:schemeClr val="tx1"/>
-            </a:fontRef>
-          </p:style>
-        </p:cxnSp>
-        <p:cxnSp>
-          <p:nvCxnSpPr>
-            <p:cNvPr id="66" name="Straight Arrow Connector 65">
-              <a:extLst>
-                <a:ext uri="{FF2B5EF4-FFF2-40B4-BE49-F238E27FC236}">
-                  <a16:creationId xmlns:a16="http://schemas.microsoft.com/office/drawing/2014/main" id="{0D8BE132-C84D-42DD-8BFF-17F76C8F9F46}"/>
-                </a:ext>
-              </a:extLst>
-            </p:cNvPr>
-            <p:cNvCxnSpPr>
-              <a:cxnSpLocks/>
-              <a:stCxn id="23" idx="2"/>
-              <a:endCxn id="24" idx="4"/>
-            </p:cNvCxnSpPr>
-            <p:nvPr/>
-          </p:nvCxnSpPr>
-          <p:spPr>
-            <a:xfrm flipH="1" flipV="1">
-              <a:off x="2003883" y="4114801"/>
-              <a:ext cx="1101382" cy="2105982"/>
-            </a:xfrm>
-            <a:prstGeom prst="straightConnector1">
-              <a:avLst/>
-            </a:prstGeom>
-            <a:ln w="19050">
-              <a:solidFill>
-                <a:schemeClr val="accent2"/>
-              </a:solidFill>
-              <a:tailEnd type="triangle" w="lg" len="lg"/>
-            </a:ln>
-          </p:spPr>
-          <p:style>
-            <a:lnRef idx="1">
-              <a:schemeClr val="dk1"/>
-            </a:lnRef>
-            <a:fillRef idx="0">
-              <a:schemeClr val="dk1"/>
-            </a:fillRef>
-            <a:effectRef idx="0">
-              <a:schemeClr val="dk1"/>
-            </a:effectRef>
-            <a:fontRef idx="minor">
-              <a:schemeClr val="tx1"/>
-            </a:fontRef>
-          </p:style>
-        </p:cxnSp>
-        <p:cxnSp>
-          <p:nvCxnSpPr>
-            <p:cNvPr id="72" name="Straight Arrow Connector 71">
-              <a:extLst>
-                <a:ext uri="{FF2B5EF4-FFF2-40B4-BE49-F238E27FC236}">
-                  <a16:creationId xmlns:a16="http://schemas.microsoft.com/office/drawing/2014/main" id="{5B15E06D-27A1-4D77-98F9-A21FFEA89E7C}"/>
-                </a:ext>
-              </a:extLst>
-            </p:cNvPr>
-            <p:cNvCxnSpPr>
-              <a:cxnSpLocks/>
-              <a:stCxn id="24" idx="0"/>
-              <a:endCxn id="16" idx="3"/>
-            </p:cNvCxnSpPr>
-            <p:nvPr/>
-          </p:nvCxnSpPr>
-          <p:spPr>
-            <a:xfrm flipV="1">
-              <a:off x="2003883" y="1688881"/>
-              <a:ext cx="1235002" cy="1978606"/>
-            </a:xfrm>
-            <a:prstGeom prst="straightConnector1">
-              <a:avLst/>
-            </a:prstGeom>
-            <a:ln w="19050">
-              <a:tailEnd type="triangle" w="lg" len="lg"/>
-            </a:ln>
-          </p:spPr>
-          <p:style>
-            <a:lnRef idx="1">
-              <a:schemeClr val="dk1"/>
-            </a:lnRef>
-            <a:fillRef idx="0">
-              <a:schemeClr val="dk1"/>
-            </a:fillRef>
-            <a:effectRef idx="0">
-              <a:schemeClr val="dk1"/>
-            </a:effectRef>
-            <a:fontRef idx="minor">
-              <a:schemeClr val="tx1"/>
-            </a:fontRef>
-          </p:style>
-        </p:cxnSp>
-        <p:cxnSp>
-          <p:nvCxnSpPr>
-            <p:cNvPr id="81" name="Straight Arrow Connector 80">
-              <a:extLst>
-                <a:ext uri="{FF2B5EF4-FFF2-40B4-BE49-F238E27FC236}">
-                  <a16:creationId xmlns:a16="http://schemas.microsoft.com/office/drawing/2014/main" id="{D74720EC-6AB6-442D-A544-B0D36E658117}"/>
-                </a:ext>
-              </a:extLst>
-            </p:cNvPr>
-            <p:cNvCxnSpPr>
-              <a:cxnSpLocks/>
-              <a:stCxn id="24" idx="6"/>
-              <a:endCxn id="21" idx="1"/>
-            </p:cNvCxnSpPr>
-            <p:nvPr/>
-          </p:nvCxnSpPr>
-          <p:spPr>
-            <a:xfrm>
-              <a:off x="2460090" y="3891144"/>
-              <a:ext cx="3826743" cy="2171490"/>
-            </a:xfrm>
-            <a:prstGeom prst="straightConnector1">
-              <a:avLst/>
-            </a:prstGeom>
-            <a:ln w="19050">
-              <a:solidFill>
-                <a:schemeClr val="accent2"/>
-              </a:solidFill>
-              <a:tailEnd type="triangle" w="lg" len="lg"/>
-            </a:ln>
-          </p:spPr>
-          <p:style>
-            <a:lnRef idx="1">
-              <a:schemeClr val="dk1"/>
-            </a:lnRef>
-            <a:fillRef idx="0">
-              <a:schemeClr val="dk1"/>
-            </a:fillRef>
-            <a:effectRef idx="0">
-              <a:schemeClr val="dk1"/>
-            </a:effectRef>
-            <a:fontRef idx="minor">
-              <a:schemeClr val="tx1"/>
-            </a:fontRef>
-          </p:style>
-        </p:cxnSp>
-      </p:grpSp>
-    </p:spTree>
-    <p:extLst>
-      <p:ext uri="{BB962C8B-B14F-4D97-AF65-F5344CB8AC3E}">
-        <p14:creationId xmlns:p14="http://schemas.microsoft.com/office/powerpoint/2010/main" val="1902432474"/>
-      </p:ext>
-    </p:extLst>
-  </p:cSld>
-  <p:clrMapOvr>
-    <a:masterClrMapping/>
-  </p:clrMapOvr>
-</p:sld>
-</file>
-
-<file path=ppt/slides/slide3.xml><?xml version="1.0" encoding="utf-8"?>
-<p:sld xmlns:a="http://schemas.openxmlformats.org/drawingml/2006/main" xmlns:r="http://schemas.openxmlformats.org/officeDocument/2006/relationships" xmlns:p="http://schemas.openxmlformats.org/presentationml/2006/main">
-  <p:cSld>
-    <p:spTree>
-      <p:nvGrpSpPr>
-        <p:cNvPr id="1" name=""/>
-        <p:cNvGrpSpPr/>
-        <p:nvPr/>
-      </p:nvGrpSpPr>
-      <p:grpSpPr>
-        <a:xfrm>
-          <a:off x="0" y="0"/>
-          <a:ext cx="0" cy="0"/>
-          <a:chOff x="0" y="0"/>
-          <a:chExt cx="0" cy="0"/>
-        </a:xfrm>
-      </p:grpSpPr>
       <p:sp>
         <p:nvSpPr>
           <p:cNvPr id="2" name="TextBox 1">

</xml_diff>